<commit_message>
Back-up with new TKA Risk Calc files
</commit_message>
<xml_diff>
--- a/FlowDiagram.pptx
+++ b/FlowDiagram.pptx
@@ -7,7 +7,7 @@
   <p:sldIdLst>
     <p:sldId id="257" r:id="rId2"/>
   </p:sldIdLst>
-  <p:sldSz cx="10972800" cy="7315200"/>
+  <p:sldSz cx="7315200" cy="7315200"/>
   <p:notesSz cx="6858000" cy="9144000"/>
   <p:defaultTextStyle>
     <a:defPPr>
@@ -166,8 +166,8 @@
         </p:nvSpPr>
         <p:spPr>
           <a:xfrm>
-            <a:off x="822960" y="2272459"/>
-            <a:ext cx="9326880" cy="1568027"/>
+            <a:off x="548640" y="2272462"/>
+            <a:ext cx="6217920" cy="1568027"/>
           </a:xfrm>
         </p:spPr>
         <p:txBody>
@@ -194,8 +194,8 @@
         </p:nvSpPr>
         <p:spPr>
           <a:xfrm>
-            <a:off x="1645921" y="4145280"/>
-            <a:ext cx="7680960" cy="1869440"/>
+            <a:off x="1097281" y="4145280"/>
+            <a:ext cx="5120640" cy="1869440"/>
           </a:xfrm>
         </p:spPr>
         <p:txBody>
@@ -328,7 +328,7 @@
               <a:pPr>
                 <a:defRPr/>
               </a:pPr>
-              <a:t>10/9/15</a:t>
+              <a:t>1/31/16</a:t>
             </a:fld>
             <a:endParaRPr lang="en-US"/>
           </a:p>
@@ -520,7 +520,7 @@
               <a:pPr>
                 <a:defRPr/>
               </a:pPr>
-              <a:t>10/9/15</a:t>
+              <a:t>1/31/16</a:t>
             </a:fld>
             <a:endParaRPr lang="en-US"/>
           </a:p>
@@ -622,8 +622,8 @@
         </p:nvSpPr>
         <p:spPr>
           <a:xfrm>
-            <a:off x="7955282" y="292953"/>
-            <a:ext cx="2468880" cy="6241627"/>
+            <a:off x="5303521" y="292956"/>
+            <a:ext cx="1645920" cy="6241627"/>
           </a:xfrm>
         </p:spPr>
         <p:txBody>
@@ -650,8 +650,8 @@
         </p:nvSpPr>
         <p:spPr>
           <a:xfrm>
-            <a:off x="548640" y="292953"/>
-            <a:ext cx="7223760" cy="6241627"/>
+            <a:off x="365760" y="292956"/>
+            <a:ext cx="4815840" cy="6241627"/>
           </a:xfrm>
         </p:spPr>
         <p:txBody>
@@ -722,7 +722,7 @@
               <a:pPr>
                 <a:defRPr/>
               </a:pPr>
-              <a:t>10/9/15</a:t>
+              <a:t>1/31/16</a:t>
             </a:fld>
             <a:endParaRPr lang="en-US"/>
           </a:p>
@@ -914,7 +914,7 @@
               <a:pPr>
                 <a:defRPr/>
               </a:pPr>
-              <a:t>10/9/15</a:t>
+              <a:t>1/31/16</a:t>
             </a:fld>
             <a:endParaRPr lang="en-US"/>
           </a:p>
@@ -1016,8 +1016,8 @@
         </p:nvSpPr>
         <p:spPr>
           <a:xfrm>
-            <a:off x="866776" y="4700698"/>
-            <a:ext cx="9326880" cy="1452880"/>
+            <a:off x="577851" y="4700698"/>
+            <a:ext cx="6217920" cy="1452880"/>
           </a:xfrm>
         </p:spPr>
         <p:txBody>
@@ -1048,8 +1048,8 @@
         </p:nvSpPr>
         <p:spPr>
           <a:xfrm>
-            <a:off x="866776" y="3100500"/>
-            <a:ext cx="9326880" cy="1600199"/>
+            <a:off x="577851" y="3100502"/>
+            <a:ext cx="6217920" cy="1600199"/>
           </a:xfrm>
         </p:spPr>
         <p:txBody>
@@ -1182,7 +1182,7 @@
               <a:pPr>
                 <a:defRPr/>
               </a:pPr>
-              <a:t>10/9/15</a:t>
+              <a:t>1/31/16</a:t>
             </a:fld>
             <a:endParaRPr lang="en-US"/>
           </a:p>
@@ -1307,8 +1307,8 @@
         </p:nvSpPr>
         <p:spPr>
           <a:xfrm>
-            <a:off x="548641" y="1706886"/>
-            <a:ext cx="4846320" cy="4827694"/>
+            <a:off x="365761" y="1706886"/>
+            <a:ext cx="3230880" cy="4827694"/>
           </a:xfrm>
         </p:spPr>
         <p:txBody>
@@ -1392,8 +1392,8 @@
         </p:nvSpPr>
         <p:spPr>
           <a:xfrm>
-            <a:off x="5577840" y="1706886"/>
-            <a:ext cx="4846320" cy="4827694"/>
+            <a:off x="3718560" y="1706886"/>
+            <a:ext cx="3230880" cy="4827694"/>
           </a:xfrm>
         </p:spPr>
         <p:txBody>
@@ -1492,7 +1492,7 @@
               <a:pPr>
                 <a:defRPr/>
               </a:pPr>
-              <a:t>10/9/15</a:t>
+              <a:t>1/31/16</a:t>
             </a:fld>
             <a:endParaRPr lang="en-US"/>
           </a:p>
@@ -1621,8 +1621,8 @@
         </p:nvSpPr>
         <p:spPr>
           <a:xfrm>
-            <a:off x="548641" y="1637454"/>
-            <a:ext cx="4848226" cy="682413"/>
+            <a:off x="365762" y="1637457"/>
+            <a:ext cx="3232151" cy="682413"/>
           </a:xfrm>
         </p:spPr>
         <p:txBody>
@@ -1686,8 +1686,8 @@
         </p:nvSpPr>
         <p:spPr>
           <a:xfrm>
-            <a:off x="548641" y="2319867"/>
-            <a:ext cx="4848226" cy="4214707"/>
+            <a:off x="365762" y="2319870"/>
+            <a:ext cx="3232151" cy="4214707"/>
           </a:xfrm>
         </p:spPr>
         <p:txBody>
@@ -1771,8 +1771,8 @@
         </p:nvSpPr>
         <p:spPr>
           <a:xfrm>
-            <a:off x="5574033" y="1637454"/>
-            <a:ext cx="4850130" cy="682413"/>
+            <a:off x="3716022" y="1637457"/>
+            <a:ext cx="3233420" cy="682413"/>
           </a:xfrm>
         </p:spPr>
         <p:txBody>
@@ -1836,8 +1836,8 @@
         </p:nvSpPr>
         <p:spPr>
           <a:xfrm>
-            <a:off x="5574033" y="2319867"/>
-            <a:ext cx="4850130" cy="4214707"/>
+            <a:off x="3716022" y="2319870"/>
+            <a:ext cx="3233420" cy="4214707"/>
           </a:xfrm>
         </p:spPr>
         <p:txBody>
@@ -1936,7 +1936,7 @@
               <a:pPr>
                 <a:defRPr/>
               </a:pPr>
-              <a:t>10/9/15</a:t>
+              <a:t>1/31/16</a:t>
             </a:fld>
             <a:endParaRPr lang="en-US"/>
           </a:p>
@@ -2076,7 +2076,7 @@
               <a:pPr>
                 <a:defRPr/>
               </a:pPr>
-              <a:t>10/9/15</a:t>
+              <a:t>1/31/16</a:t>
             </a:fld>
             <a:endParaRPr lang="en-US"/>
           </a:p>
@@ -2193,7 +2193,7 @@
               <a:pPr>
                 <a:defRPr/>
               </a:pPr>
-              <a:t>10/9/15</a:t>
+              <a:t>1/31/16</a:t>
             </a:fld>
             <a:endParaRPr lang="en-US"/>
           </a:p>
@@ -2295,8 +2295,8 @@
         </p:nvSpPr>
         <p:spPr>
           <a:xfrm>
-            <a:off x="548643" y="291253"/>
-            <a:ext cx="3609976" cy="1239520"/>
+            <a:off x="365763" y="291253"/>
+            <a:ext cx="2406651" cy="1239520"/>
           </a:xfrm>
         </p:spPr>
         <p:txBody>
@@ -2327,8 +2327,8 @@
         </p:nvSpPr>
         <p:spPr>
           <a:xfrm>
-            <a:off x="4290062" y="291259"/>
-            <a:ext cx="6134101" cy="6243321"/>
+            <a:off x="2860043" y="291262"/>
+            <a:ext cx="4089401" cy="6243321"/>
           </a:xfrm>
         </p:spPr>
         <p:txBody>
@@ -2412,8 +2412,8 @@
         </p:nvSpPr>
         <p:spPr>
           <a:xfrm>
-            <a:off x="548643" y="1530777"/>
-            <a:ext cx="3609976" cy="5003801"/>
+            <a:off x="365763" y="1530780"/>
+            <a:ext cx="2406651" cy="5003801"/>
           </a:xfrm>
         </p:spPr>
         <p:txBody>
@@ -2492,7 +2492,7 @@
               <a:pPr>
                 <a:defRPr/>
               </a:pPr>
-              <a:t>10/9/15</a:t>
+              <a:t>1/31/16</a:t>
             </a:fld>
             <a:endParaRPr lang="en-US"/>
           </a:p>
@@ -2594,8 +2594,8 @@
         </p:nvSpPr>
         <p:spPr>
           <a:xfrm>
-            <a:off x="2150747" y="5120641"/>
-            <a:ext cx="6583680" cy="604521"/>
+            <a:off x="1433831" y="5120644"/>
+            <a:ext cx="4389120" cy="604521"/>
           </a:xfrm>
         </p:spPr>
         <p:txBody>
@@ -2626,8 +2626,8 @@
         </p:nvSpPr>
         <p:spPr>
           <a:xfrm>
-            <a:off x="2150747" y="653627"/>
-            <a:ext cx="6583680" cy="4389120"/>
+            <a:off x="1433831" y="653627"/>
+            <a:ext cx="4389120" cy="4389120"/>
           </a:xfrm>
         </p:spPr>
         <p:txBody>
@@ -2690,8 +2690,8 @@
         </p:nvSpPr>
         <p:spPr>
           <a:xfrm>
-            <a:off x="2150747" y="5725162"/>
-            <a:ext cx="6583680" cy="858519"/>
+            <a:off x="1433831" y="5725165"/>
+            <a:ext cx="4389120" cy="858519"/>
           </a:xfrm>
         </p:spPr>
         <p:txBody>
@@ -2770,7 +2770,7 @@
               <a:pPr>
                 <a:defRPr/>
               </a:pPr>
-              <a:t>10/9/15</a:t>
+              <a:t>1/31/16</a:t>
             </a:fld>
             <a:endParaRPr lang="en-US"/>
           </a:p>
@@ -2877,8 +2877,8 @@
         </p:nvSpPr>
         <p:spPr bwMode="auto">
           <a:xfrm>
-            <a:off x="549275" y="293688"/>
-            <a:ext cx="9874250" cy="1219200"/>
+            <a:off x="366185" y="293688"/>
+            <a:ext cx="6582833" cy="1219200"/>
           </a:xfrm>
           <a:prstGeom prst="rect">
             <a:avLst/>
@@ -2919,8 +2919,8 @@
         </p:nvSpPr>
         <p:spPr bwMode="auto">
           <a:xfrm>
-            <a:off x="549275" y="1706563"/>
-            <a:ext cx="9874250" cy="4827587"/>
+            <a:off x="366185" y="1706564"/>
+            <a:ext cx="6582833" cy="4827587"/>
           </a:xfrm>
           <a:prstGeom prst="rect">
             <a:avLst/>
@@ -2989,8 +2989,8 @@
         </p:nvSpPr>
         <p:spPr>
           <a:xfrm>
-            <a:off x="549275" y="6780213"/>
-            <a:ext cx="2559050" cy="388937"/>
+            <a:off x="366185" y="6780216"/>
+            <a:ext cx="1706033" cy="388937"/>
           </a:xfrm>
           <a:prstGeom prst="rect">
             <a:avLst/>
@@ -3026,7 +3026,7 @@
               <a:pPr>
                 <a:defRPr/>
               </a:pPr>
-              <a:t>10/9/15</a:t>
+              <a:t>1/31/16</a:t>
             </a:fld>
             <a:endParaRPr lang="en-US"/>
           </a:p>
@@ -3044,8 +3044,8 @@
         </p:nvSpPr>
         <p:spPr>
           <a:xfrm>
-            <a:off x="3749675" y="6780213"/>
-            <a:ext cx="3473450" cy="388937"/>
+            <a:off x="2499785" y="6780216"/>
+            <a:ext cx="2315633" cy="388937"/>
           </a:xfrm>
           <a:prstGeom prst="rect">
             <a:avLst/>
@@ -3092,8 +3092,8 @@
         </p:nvSpPr>
         <p:spPr>
           <a:xfrm>
-            <a:off x="7864475" y="6780213"/>
-            <a:ext cx="2559050" cy="388937"/>
+            <a:off x="5242985" y="6780216"/>
+            <a:ext cx="1706033" cy="388937"/>
           </a:xfrm>
           <a:prstGeom prst="rect">
             <a:avLst/>
@@ -3558,8 +3558,8 @@
         </p:nvSpPr>
         <p:spPr>
           <a:xfrm>
-            <a:off x="3412760" y="152400"/>
-            <a:ext cx="4343400" cy="1090404"/>
+            <a:off x="914400" y="152401"/>
+            <a:ext cx="3657600" cy="1090404"/>
           </a:xfrm>
           <a:prstGeom prst="rect">
             <a:avLst/>
@@ -3587,7 +3587,7 @@
           </a:fontRef>
         </p:style>
         <p:txBody>
-          <a:bodyPr lIns="104498" tIns="52249" rIns="104498" bIns="52249">
+          <a:bodyPr wrap="square" lIns="104498" tIns="52249" rIns="104498" bIns="52249">
             <a:spAutoFit/>
           </a:bodyPr>
           <a:lstStyle/>
@@ -3609,27 +3609,7 @@
                 <a:latin typeface="Palatino Linotype" pitchFamily="18" charset="0"/>
                 <a:cs typeface="B Mitra" pitchFamily="2" charset="-78"/>
               </a:rPr>
-              <a:t>All Total Knee </a:t>
-            </a:r>
-            <a:r>
-              <a:rPr lang="en-US" sz="1600" b="1" dirty="0" err="1" smtClean="0">
-                <a:solidFill>
-                  <a:schemeClr val="tx1"/>
-                </a:solidFill>
-                <a:latin typeface="Palatino Linotype" pitchFamily="18" charset="0"/>
-                <a:cs typeface="B Mitra" pitchFamily="2" charset="-78"/>
-              </a:rPr>
-              <a:t>Arthroplasties</a:t>
-            </a:r>
-            <a:r>
-              <a:rPr lang="en-US" sz="1600" b="1" dirty="0" smtClean="0">
-                <a:solidFill>
-                  <a:schemeClr val="tx1"/>
-                </a:solidFill>
-                <a:latin typeface="Palatino Linotype" pitchFamily="18" charset="0"/>
-                <a:cs typeface="B Mitra" pitchFamily="2" charset="-78"/>
-              </a:rPr>
-              <a:t> (TKAs) </a:t>
+              <a:t>All Total Knee Arthroplasties (TKAs) </a:t>
             </a:r>
           </a:p>
           <a:p>
@@ -3671,7 +3651,7 @@
                 <a:latin typeface="Palatino Linotype" pitchFamily="18" charset="0"/>
                 <a:cs typeface="B Mitra" pitchFamily="2" charset="-78"/>
               </a:rPr>
-              <a:t>2006-2011</a:t>
+              <a:t>2006 - 2011</a:t>
             </a:r>
           </a:p>
           <a:p>
@@ -3692,7 +3672,7 @@
                 <a:latin typeface="Palatino Linotype" pitchFamily="18" charset="0"/>
                 <a:cs typeface="B Mitra" pitchFamily="2" charset="-78"/>
               </a:rPr>
-              <a:t>Original n = 39,636</a:t>
+              <a:t>n = 39,636</a:t>
             </a:r>
             <a:endParaRPr lang="en-US" sz="1600" b="1" dirty="0">
               <a:solidFill>
@@ -3712,8 +3692,8 @@
         </p:nvSpPr>
         <p:spPr>
           <a:xfrm>
-            <a:off x="3425634" y="1905000"/>
-            <a:ext cx="4329081" cy="844182"/>
+            <a:off x="914400" y="1905000"/>
+            <a:ext cx="3657600" cy="844182"/>
           </a:xfrm>
           <a:prstGeom prst="rect">
             <a:avLst/>
@@ -3741,7 +3721,7 @@
           </a:fontRef>
         </p:style>
         <p:txBody>
-          <a:bodyPr lIns="104498" tIns="52249" rIns="104498" bIns="52249">
+          <a:bodyPr wrap="square" lIns="104498" tIns="52249" rIns="104498" bIns="52249">
             <a:spAutoFit/>
           </a:bodyPr>
           <a:lstStyle/>
@@ -3804,8 +3784,8 @@
         </p:nvSpPr>
         <p:spPr>
           <a:xfrm>
-            <a:off x="3429000" y="3352800"/>
-            <a:ext cx="4329081" cy="844182"/>
+            <a:off x="914400" y="3352800"/>
+            <a:ext cx="3657600" cy="844182"/>
           </a:xfrm>
           <a:prstGeom prst="rect">
             <a:avLst/>
@@ -3833,7 +3813,7 @@
           </a:fontRef>
         </p:style>
         <p:txBody>
-          <a:bodyPr lIns="104498" tIns="52249" rIns="104498" bIns="52249">
+          <a:bodyPr wrap="square" lIns="104498" tIns="52249" rIns="104498" bIns="52249">
             <a:spAutoFit/>
           </a:bodyPr>
           <a:lstStyle/>
@@ -3855,7 +3835,7 @@
                 <a:latin typeface="Palatino Linotype" pitchFamily="18" charset="0"/>
                 <a:cs typeface="B Mitra" pitchFamily="2" charset="-78"/>
               </a:rPr>
-              <a:t>Cases with Revision Dates Recorded Before Original TKA Dates Removed</a:t>
+              <a:t>Cases with Revision Recorded Before Original TKA Removed</a:t>
             </a:r>
           </a:p>
           <a:p>
@@ -3876,7 +3856,17 @@
                 <a:latin typeface="Palatino Linotype" pitchFamily="18" charset="0"/>
                 <a:cs typeface="B Mitra" pitchFamily="2" charset="-78"/>
               </a:rPr>
-              <a:t>n = 39,133</a:t>
+              <a:t>n = </a:t>
+            </a:r>
+            <a:r>
+              <a:rPr lang="en-US" sz="1600" b="1" dirty="0" smtClean="0">
+                <a:solidFill>
+                  <a:schemeClr val="tx1"/>
+                </a:solidFill>
+                <a:latin typeface="Palatino Linotype" pitchFamily="18" charset="0"/>
+                <a:cs typeface="B Mitra" pitchFamily="2" charset="-78"/>
+              </a:rPr>
+              <a:t>39,064</a:t>
             </a:r>
             <a:endParaRPr lang="en-US" sz="1600" b="1" dirty="0">
               <a:solidFill>
@@ -3896,8 +3886,8 @@
         </p:nvSpPr>
         <p:spPr>
           <a:xfrm>
-            <a:off x="3429000" y="4870818"/>
-            <a:ext cx="4329081" cy="844182"/>
+            <a:off x="914400" y="4870818"/>
+            <a:ext cx="3657600" cy="844182"/>
           </a:xfrm>
           <a:prstGeom prst="rect">
             <a:avLst/>
@@ -3925,7 +3915,7 @@
           </a:fontRef>
         </p:style>
         <p:txBody>
-          <a:bodyPr lIns="104498" tIns="52249" rIns="104498" bIns="52249">
+          <a:bodyPr wrap="square" lIns="104498" tIns="52249" rIns="104498" bIns="52249">
             <a:spAutoFit/>
           </a:bodyPr>
           <a:lstStyle/>
@@ -3947,7 +3937,7 @@
                 <a:latin typeface="Palatino Linotype" pitchFamily="18" charset="0"/>
                 <a:cs typeface="B Mitra" pitchFamily="2" charset="-78"/>
               </a:rPr>
-              <a:t>Cases with Operation Times Recorded as Zero Minutes Removed</a:t>
+              <a:t>Cases with Operation Times Recorded as 0 Minutes Removed</a:t>
             </a:r>
           </a:p>
           <a:p>
@@ -3968,7 +3958,17 @@
                 <a:latin typeface="Palatino Linotype" pitchFamily="18" charset="0"/>
                 <a:cs typeface="B Mitra" pitchFamily="2" charset="-78"/>
               </a:rPr>
-              <a:t>n = 38,817</a:t>
+              <a:t>n = </a:t>
+            </a:r>
+            <a:r>
+              <a:rPr lang="en-US" sz="1600" b="1" dirty="0" smtClean="0">
+                <a:solidFill>
+                  <a:schemeClr val="tx1"/>
+                </a:solidFill>
+                <a:latin typeface="Palatino Linotype" pitchFamily="18" charset="0"/>
+                <a:cs typeface="B Mitra" pitchFamily="2" charset="-78"/>
+              </a:rPr>
+              <a:t>38,748</a:t>
             </a:r>
             <a:endParaRPr lang="en-US" sz="1600" b="1" dirty="0">
               <a:solidFill>
@@ -3988,8 +3988,8 @@
         </p:nvSpPr>
         <p:spPr>
           <a:xfrm>
-            <a:off x="3429000" y="6336239"/>
-            <a:ext cx="4329081" cy="597961"/>
+            <a:off x="914400" y="6336241"/>
+            <a:ext cx="3657600" cy="844182"/>
           </a:xfrm>
           <a:prstGeom prst="rect">
             <a:avLst/>
@@ -4017,7 +4017,7 @@
           </a:fontRef>
         </p:style>
         <p:txBody>
-          <a:bodyPr lIns="104498" tIns="52249" rIns="104498" bIns="52249">
+          <a:bodyPr wrap="square" lIns="104498" tIns="52249" rIns="104498" bIns="52249">
             <a:spAutoFit/>
           </a:bodyPr>
           <a:lstStyle/>
@@ -4060,7 +4060,17 @@
                 <a:latin typeface="Palatino Linotype" pitchFamily="18" charset="0"/>
                 <a:cs typeface="B Mitra" pitchFamily="2" charset="-78"/>
               </a:rPr>
-              <a:t>Final n = 33,642</a:t>
+              <a:t>n = </a:t>
+            </a:r>
+            <a:r>
+              <a:rPr lang="en-US" sz="1600" b="1" dirty="0" smtClean="0">
+                <a:solidFill>
+                  <a:schemeClr val="tx1"/>
+                </a:solidFill>
+                <a:latin typeface="Palatino Linotype" pitchFamily="18" charset="0"/>
+                <a:cs typeface="B Mitra" pitchFamily="2" charset="-78"/>
+              </a:rPr>
+              <a:t>33,573</a:t>
             </a:r>
             <a:endParaRPr lang="en-US" sz="1600" b="1" dirty="0">
               <a:solidFill>
@@ -4080,8 +4090,8 @@
         </p:nvCxnSpPr>
         <p:spPr>
           <a:xfrm>
-            <a:off x="5486399" y="1295400"/>
-            <a:ext cx="3" cy="533402"/>
+            <a:off x="2819400" y="1295400"/>
+            <a:ext cx="2" cy="533402"/>
           </a:xfrm>
           <a:prstGeom prst="straightConnector1">
             <a:avLst/>
@@ -4116,8 +4126,8 @@
         </p:nvCxnSpPr>
         <p:spPr>
           <a:xfrm>
-            <a:off x="5486400" y="2819400"/>
-            <a:ext cx="3" cy="533402"/>
+            <a:off x="2819400" y="2819400"/>
+            <a:ext cx="2" cy="533402"/>
           </a:xfrm>
           <a:prstGeom prst="straightConnector1">
             <a:avLst/>
@@ -4152,8 +4162,8 @@
         </p:nvCxnSpPr>
         <p:spPr>
           <a:xfrm>
-            <a:off x="5486400" y="4267200"/>
-            <a:ext cx="3" cy="533402"/>
+            <a:off x="2819400" y="4267200"/>
+            <a:ext cx="2" cy="533402"/>
           </a:xfrm>
           <a:prstGeom prst="straightConnector1">
             <a:avLst/>
@@ -4188,8 +4198,8 @@
         </p:nvCxnSpPr>
         <p:spPr>
           <a:xfrm>
-            <a:off x="5486400" y="5791198"/>
-            <a:ext cx="3" cy="533402"/>
+            <a:off x="2819400" y="5791200"/>
+            <a:ext cx="2" cy="533402"/>
           </a:xfrm>
           <a:prstGeom prst="straightConnector1">
             <a:avLst/>
@@ -4224,8 +4234,8 @@
         </p:nvCxnSpPr>
         <p:spPr>
           <a:xfrm>
-            <a:off x="5791200" y="1524000"/>
-            <a:ext cx="2286000" cy="0"/>
+            <a:off x="3860800" y="1524000"/>
+            <a:ext cx="1524000" cy="0"/>
           </a:xfrm>
           <a:prstGeom prst="straightConnector1">
             <a:avLst/>
@@ -4260,8 +4270,8 @@
         </p:nvCxnSpPr>
         <p:spPr>
           <a:xfrm>
-            <a:off x="5791200" y="6096000"/>
-            <a:ext cx="2286000" cy="0"/>
+            <a:off x="3860800" y="6096000"/>
+            <a:ext cx="1524000" cy="0"/>
           </a:xfrm>
           <a:prstGeom prst="straightConnector1">
             <a:avLst/>
@@ -4296,8 +4306,8 @@
         </p:nvCxnSpPr>
         <p:spPr>
           <a:xfrm>
-            <a:off x="5791200" y="4572000"/>
-            <a:ext cx="2286000" cy="0"/>
+            <a:off x="3860800" y="4572000"/>
+            <a:ext cx="1524000" cy="0"/>
           </a:xfrm>
           <a:prstGeom prst="straightConnector1">
             <a:avLst/>
@@ -4332,8 +4342,8 @@
         </p:nvCxnSpPr>
         <p:spPr>
           <a:xfrm>
-            <a:off x="5791200" y="3048000"/>
-            <a:ext cx="2286000" cy="0"/>
+            <a:off x="3860800" y="3048000"/>
+            <a:ext cx="1524000" cy="0"/>
           </a:xfrm>
           <a:prstGeom prst="straightConnector1">
             <a:avLst/>
@@ -4368,20 +4378,26 @@
         </p:nvSpPr>
         <p:spPr>
           <a:xfrm>
-            <a:off x="8305800" y="1295400"/>
-            <a:ext cx="1090676" cy="415498"/>
+            <a:off x="5537200" y="1295400"/>
+            <a:ext cx="1244600" cy="415498"/>
           </a:xfrm>
           <a:prstGeom prst="rect">
             <a:avLst/>
           </a:prstGeom>
           <a:noFill/>
+          <a:ln>
+            <a:solidFill>
+              <a:schemeClr val="tx1"/>
+            </a:solidFill>
+          </a:ln>
         </p:spPr>
         <p:txBody>
-          <a:bodyPr wrap="none" rtlCol="0">
+          <a:bodyPr wrap="square" rtlCol="0">
             <a:spAutoFit/>
           </a:bodyPr>
           <a:lstStyle/>
           <a:p>
+            <a:pPr algn="ctr"/>
             <a:r>
               <a:rPr lang="en-US" dirty="0" smtClean="0"/>
               <a:t>n = 407</a:t>
@@ -4398,23 +4414,33 @@
         </p:nvSpPr>
         <p:spPr>
           <a:xfrm>
-            <a:off x="8305800" y="2819400"/>
-            <a:ext cx="940901" cy="415498"/>
+            <a:off x="5537200" y="2819400"/>
+            <a:ext cx="1244600" cy="415498"/>
           </a:xfrm>
           <a:prstGeom prst="rect">
             <a:avLst/>
           </a:prstGeom>
           <a:noFill/>
+          <a:ln>
+            <a:solidFill>
+              <a:schemeClr val="tx1"/>
+            </a:solidFill>
+          </a:ln>
         </p:spPr>
         <p:txBody>
-          <a:bodyPr wrap="none" rtlCol="0">
+          <a:bodyPr wrap="square" rtlCol="0">
             <a:spAutoFit/>
           </a:bodyPr>
           <a:lstStyle/>
           <a:p>
+            <a:pPr algn="ctr"/>
             <a:r>
               <a:rPr lang="en-US" dirty="0" smtClean="0"/>
-              <a:t>n = 96</a:t>
+              <a:t>n = </a:t>
+            </a:r>
+            <a:r>
+              <a:rPr lang="en-US" dirty="0" smtClean="0"/>
+              <a:t>165</a:t>
             </a:r>
             <a:endParaRPr lang="en-US" dirty="0"/>
           </a:p>
@@ -4428,20 +4454,26 @@
         </p:nvSpPr>
         <p:spPr>
           <a:xfrm>
-            <a:off x="8305800" y="4343400"/>
-            <a:ext cx="1090676" cy="415498"/>
+            <a:off x="5537200" y="4343400"/>
+            <a:ext cx="1244600" cy="415498"/>
           </a:xfrm>
           <a:prstGeom prst="rect">
             <a:avLst/>
           </a:prstGeom>
           <a:noFill/>
+          <a:ln>
+            <a:solidFill>
+              <a:schemeClr val="tx1"/>
+            </a:solidFill>
+          </a:ln>
         </p:spPr>
         <p:txBody>
-          <a:bodyPr wrap="none" rtlCol="0">
+          <a:bodyPr wrap="square" rtlCol="0">
             <a:spAutoFit/>
           </a:bodyPr>
           <a:lstStyle/>
           <a:p>
+            <a:pPr algn="ctr"/>
             <a:r>
               <a:rPr lang="en-US" dirty="0" smtClean="0"/>
               <a:t>n = 316</a:t>
@@ -4458,20 +4490,26 @@
         </p:nvSpPr>
         <p:spPr>
           <a:xfrm>
-            <a:off x="8305800" y="5867400"/>
-            <a:ext cx="1240450" cy="415498"/>
+            <a:off x="5537200" y="5867400"/>
+            <a:ext cx="1244600" cy="415498"/>
           </a:xfrm>
           <a:prstGeom prst="rect">
             <a:avLst/>
           </a:prstGeom>
           <a:noFill/>
+          <a:ln>
+            <a:solidFill>
+              <a:schemeClr val="tx1"/>
+            </a:solidFill>
+          </a:ln>
         </p:spPr>
         <p:txBody>
-          <a:bodyPr wrap="none" rtlCol="0">
+          <a:bodyPr wrap="square" rtlCol="0">
             <a:spAutoFit/>
           </a:bodyPr>
           <a:lstStyle/>
           <a:p>
+            <a:pPr algn="ctr"/>
             <a:r>
               <a:rPr lang="en-US" dirty="0" smtClean="0"/>
               <a:t>n = 5175</a:t>

</xml_diff>